<commit_message>
Alterado os nomes dos modelos de apresentacao para Modelo e actualizacao no TFC
</commit_message>
<xml_diff>
--- a/Apresentação/TFC.pptx
+++ b/Apresentação/TFC.pptx
@@ -267,7 +267,7 @@
           <a:p>
             <a:fld id="{8D980AF6-012E-48EC-B6FF-B729D5392FE6}" type="datetimeFigureOut">
               <a:rPr lang="pt-BR" smtClean="0"/>
-              <a:t>22/05/2024</a:t>
+              <a:t>24/05/2024</a:t>
             </a:fld>
             <a:endParaRPr lang="pt-BR"/>
           </a:p>
@@ -1906,7 +1906,7 @@
             <a:fld id="{5A5E2DE2-A0B4-45FD-A905-FEFD5975439B}" type="datetimeFigureOut">
               <a:rPr lang="pt-PT" smtClean="0"/>
               <a:pPr/>
-              <a:t>22/05/2024</a:t>
+              <a:t>24/05/2024</a:t>
             </a:fld>
             <a:endParaRPr lang="pt-PT" dirty="0"/>
           </a:p>
@@ -2146,7 +2146,7 @@
             <a:fld id="{5A5E2DE2-A0B4-45FD-A905-FEFD5975439B}" type="datetimeFigureOut">
               <a:rPr lang="pt-PT" smtClean="0"/>
               <a:pPr/>
-              <a:t>22/05/2024</a:t>
+              <a:t>24/05/2024</a:t>
             </a:fld>
             <a:endParaRPr lang="pt-PT" dirty="0"/>
           </a:p>
@@ -2328,7 +2328,7 @@
             <a:fld id="{5A5E2DE2-A0B4-45FD-A905-FEFD5975439B}" type="datetimeFigureOut">
               <a:rPr lang="pt-PT" smtClean="0"/>
               <a:pPr/>
-              <a:t>22/05/2024</a:t>
+              <a:t>24/05/2024</a:t>
             </a:fld>
             <a:endParaRPr lang="pt-PT" dirty="0"/>
           </a:p>
@@ -2500,7 +2500,7 @@
             <a:fld id="{5A5E2DE2-A0B4-45FD-A905-FEFD5975439B}" type="datetimeFigureOut">
               <a:rPr lang="pt-PT" smtClean="0"/>
               <a:pPr/>
-              <a:t>22/05/2024</a:t>
+              <a:t>24/05/2024</a:t>
             </a:fld>
             <a:endParaRPr lang="pt-PT" dirty="0"/>
           </a:p>
@@ -2770,7 +2770,7 @@
             <a:fld id="{5A5E2DE2-A0B4-45FD-A905-FEFD5975439B}" type="datetimeFigureOut">
               <a:rPr lang="pt-PT" smtClean="0"/>
               <a:pPr/>
-              <a:t>22/05/2024</a:t>
+              <a:t>24/05/2024</a:t>
             </a:fld>
             <a:endParaRPr lang="pt-PT" dirty="0"/>
           </a:p>
@@ -3973,7 +3973,7 @@
             <a:fld id="{5A5E2DE2-A0B4-45FD-A905-FEFD5975439B}" type="datetimeFigureOut">
               <a:rPr lang="pt-PT" smtClean="0"/>
               <a:pPr/>
-              <a:t>22/05/2024</a:t>
+              <a:t>24/05/2024</a:t>
             </a:fld>
             <a:endParaRPr lang="pt-PT" dirty="0"/>
           </a:p>
@@ -4365,7 +4365,7 @@
             <a:fld id="{5A5E2DE2-A0B4-45FD-A905-FEFD5975439B}" type="datetimeFigureOut">
               <a:rPr lang="pt-PT" smtClean="0"/>
               <a:pPr/>
-              <a:t>22/05/2024</a:t>
+              <a:t>24/05/2024</a:t>
             </a:fld>
             <a:endParaRPr lang="pt-PT" dirty="0"/>
           </a:p>
@@ -4490,7 +4490,7 @@
             <a:fld id="{5A5E2DE2-A0B4-45FD-A905-FEFD5975439B}" type="datetimeFigureOut">
               <a:rPr lang="pt-PT" smtClean="0"/>
               <a:pPr/>
-              <a:t>22/05/2024</a:t>
+              <a:t>24/05/2024</a:t>
             </a:fld>
             <a:endParaRPr lang="pt-PT" dirty="0"/>
           </a:p>
@@ -4587,7 +4587,7 @@
             <a:fld id="{5A5E2DE2-A0B4-45FD-A905-FEFD5975439B}" type="datetimeFigureOut">
               <a:rPr lang="pt-PT" smtClean="0"/>
               <a:pPr/>
-              <a:t>22/05/2024</a:t>
+              <a:t>24/05/2024</a:t>
             </a:fld>
             <a:endParaRPr lang="pt-PT" dirty="0"/>
           </a:p>
@@ -5352,7 +5352,7 @@
             <a:fld id="{5A5E2DE2-A0B4-45FD-A905-FEFD5975439B}" type="datetimeFigureOut">
               <a:rPr lang="pt-PT" smtClean="0"/>
               <a:pPr/>
-              <a:t>22/05/2024</a:t>
+              <a:t>24/05/2024</a:t>
             </a:fld>
             <a:endParaRPr lang="pt-PT" dirty="0"/>
           </a:p>
@@ -6194,7 +6194,7 @@
             <a:fld id="{5A5E2DE2-A0B4-45FD-A905-FEFD5975439B}" type="datetimeFigureOut">
               <a:rPr lang="pt-PT" smtClean="0"/>
               <a:pPr/>
-              <a:t>22/05/2024</a:t>
+              <a:t>24/05/2024</a:t>
             </a:fld>
             <a:endParaRPr lang="pt-PT" dirty="0"/>
           </a:p>
@@ -6423,7 +6423,7 @@
             <a:fld id="{5A5E2DE2-A0B4-45FD-A905-FEFD5975439B}" type="datetimeFigureOut">
               <a:rPr lang="pt-PT" smtClean="0"/>
               <a:pPr/>
-              <a:t>22/05/2024</a:t>
+              <a:t>24/05/2024</a:t>
             </a:fld>
             <a:endParaRPr lang="pt-PT" dirty="0"/>
           </a:p>
@@ -7907,6 +7907,13 @@
   <p:clrMapOvr>
     <a:masterClrMapping/>
   </p:clrMapOvr>
+  <p:timing>
+    <p:tnLst>
+      <p:par>
+        <p:cTn id="1" dur="indefinite" restart="never" nodeType="tmRoot"/>
+      </p:par>
+    </p:tnLst>
+  </p:timing>
 </p:sld>
 </file>
 
@@ -10956,6 +10963,13 @@
   <p:clrMapOvr>
     <a:masterClrMapping/>
   </p:clrMapOvr>
+  <p:timing>
+    <p:tnLst>
+      <p:par>
+        <p:cTn id="1" dur="indefinite" restart="never" nodeType="tmRoot"/>
+      </p:par>
+    </p:tnLst>
+  </p:timing>
 </p:sld>
 </file>
 
@@ -12753,55 +12767,6 @@
           <a:chExt cx="0" cy="0"/>
         </a:xfrm>
       </p:grpSpPr>
-      <p:pic>
-        <p:nvPicPr>
-          <p:cNvPr id="5" name="Marcador de Posição de Conteúdo 4">
-            <a:extLst>
-              <a:ext uri="{FF2B5EF4-FFF2-40B4-BE49-F238E27FC236}">
-                <a16:creationId xmlns:a16="http://schemas.microsoft.com/office/drawing/2014/main" id="{1D6EAF38-566F-0488-0BDF-3892014436C8}"/>
-              </a:ext>
-            </a:extLst>
-          </p:cNvPr>
-          <p:cNvPicPr>
-            <a:picLocks noGrp="1" noChangeAspect="1"/>
-          </p:cNvPicPr>
-          <p:nvPr>
-            <p:ph idx="1"/>
-          </p:nvPr>
-        </p:nvPicPr>
-        <p:blipFill>
-          <a:blip r:embed="rId2">
-            <a:extLst>
-              <a:ext uri="{28A0092B-C50C-407E-A947-70E740481C1C}">
-                <a14:useLocalDpi xmlns:a14="http://schemas.microsoft.com/office/drawing/2010/main" val="0"/>
-              </a:ext>
-            </a:extLst>
-          </a:blip>
-          <a:srcRect/>
-          <a:stretch/>
-        </p:blipFill>
-        <p:spPr>
-          <a:xfrm>
-            <a:off x="7610622" y="776734"/>
-            <a:ext cx="4093698" cy="4878478"/>
-          </a:xfrm>
-          <a:solidFill>
-            <a:schemeClr val="accent1"/>
-          </a:solidFill>
-          <a:ln>
-            <a:solidFill>
-              <a:schemeClr val="bg1"/>
-            </a:solidFill>
-          </a:ln>
-          <a:effectLst>
-            <a:outerShdw blurRad="50800" dist="38100" dir="2700000" algn="tl" rotWithShape="0">
-              <a:prstClr val="black">
-                <a:alpha val="40000"/>
-              </a:prstClr>
-            </a:outerShdw>
-          </a:effectLst>
-        </p:spPr>
-      </p:pic>
       <p:sp>
         <p:nvSpPr>
           <p:cNvPr id="3" name="CaixaDeTexto 2"/>
@@ -12848,8 +12813,8 @@
         </p:nvSpPr>
         <p:spPr bwMode="auto">
           <a:xfrm>
-            <a:off x="1353502" y="2257125"/>
-            <a:ext cx="5964572" cy="2793842"/>
+            <a:off x="1353502" y="2811124"/>
+            <a:ext cx="5964572" cy="1685846"/>
           </a:xfrm>
           <a:prstGeom prst="rect">
             <a:avLst/>
@@ -12909,12 +12874,16 @@
               </a:spcAft>
             </a:pPr>
             <a:r>
-              <a:rPr lang="pt-PT" sz="2400" dirty="0">
+              <a:rPr lang="pt-PT" sz="2400" dirty="0" smtClean="0">
                 <a:latin typeface="+mj-lt"/>
                 <a:ea typeface="Calibri" panose="020F0502020204030204" pitchFamily="34" charset="0"/>
               </a:rPr>
-              <a:t>Atualmente, empresas estão valorizando os softwares de gestão para melhorar suas operações, reconhecendo sua importância crescente impulsionada pela demanda por soluções de alta qualidade. </a:t>
-            </a:r>
+              <a:t>TFC, que significa Trabalho de Fim de Curso é uma avaliação feita ao estudante no fim da licenciatura. </a:t>
+            </a:r>
+            <a:endParaRPr lang="pt-PT" sz="2400" dirty="0">
+              <a:latin typeface="+mj-lt"/>
+              <a:ea typeface="Calibri" panose="020F0502020204030204" pitchFamily="34" charset="0"/>
+            </a:endParaRPr>
           </a:p>
         </p:txBody>
       </p:sp>
@@ -12931,86 +12900,7 @@
   <p:timing>
     <p:tnLst>
       <p:par>
-        <p:cTn id="1" dur="indefinite" restart="never" nodeType="tmRoot">
-          <p:childTnLst>
-            <p:seq concurrent="1" nextAc="seek">
-              <p:cTn id="2" dur="indefinite" nodeType="mainSeq">
-                <p:childTnLst>
-                  <p:par>
-                    <p:cTn id="3" fill="hold">
-                      <p:stCondLst>
-                        <p:cond delay="indefinite"/>
-                        <p:cond evt="onBegin" delay="0">
-                          <p:tn val="2"/>
-                        </p:cond>
-                      </p:stCondLst>
-                      <p:childTnLst>
-                        <p:par>
-                          <p:cTn id="4" fill="hold">
-                            <p:stCondLst>
-                              <p:cond delay="0"/>
-                            </p:stCondLst>
-                            <p:childTnLst>
-                              <p:par>
-                                <p:cTn id="5" presetID="21" presetClass="entr" presetSubtype="1" fill="hold" nodeType="withEffect">
-                                  <p:stCondLst>
-                                    <p:cond delay="0"/>
-                                  </p:stCondLst>
-                                  <p:childTnLst>
-                                    <p:set>
-                                      <p:cBhvr>
-                                        <p:cTn id="6" dur="1" fill="hold">
-                                          <p:stCondLst>
-                                            <p:cond delay="0"/>
-                                          </p:stCondLst>
-                                        </p:cTn>
-                                        <p:tgtEl>
-                                          <p:spTgt spid="5"/>
-                                        </p:tgtEl>
-                                        <p:attrNameLst>
-                                          <p:attrName>style.visibility</p:attrName>
-                                        </p:attrNameLst>
-                                      </p:cBhvr>
-                                      <p:to>
-                                        <p:strVal val="visible"/>
-                                      </p:to>
-                                    </p:set>
-                                    <p:animEffect transition="in" filter="wheel(1)">
-                                      <p:cBhvr>
-                                        <p:cTn id="7" dur="2000"/>
-                                        <p:tgtEl>
-                                          <p:spTgt spid="5"/>
-                                        </p:tgtEl>
-                                      </p:cBhvr>
-                                    </p:animEffect>
-                                  </p:childTnLst>
-                                </p:cTn>
-                              </p:par>
-                            </p:childTnLst>
-                          </p:cTn>
-                        </p:par>
-                      </p:childTnLst>
-                    </p:cTn>
-                  </p:par>
-                </p:childTnLst>
-              </p:cTn>
-              <p:prevCondLst>
-                <p:cond evt="onPrev" delay="0">
-                  <p:tgtEl>
-                    <p:sldTgt/>
-                  </p:tgtEl>
-                </p:cond>
-              </p:prevCondLst>
-              <p:nextCondLst>
-                <p:cond evt="onNext" delay="0">
-                  <p:tgtEl>
-                    <p:sldTgt/>
-                  </p:tgtEl>
-                </p:cond>
-              </p:nextCondLst>
-            </p:seq>
-          </p:childTnLst>
-        </p:cTn>
+        <p:cTn id="1" dur="indefinite" restart="never" nodeType="tmRoot"/>
       </p:par>
     </p:tnLst>
   </p:timing>
@@ -13130,7 +13020,14 @@
                 <a:latin typeface="+mj-lt"/>
                 <a:ea typeface="Calibri" panose="020F0502020204030204" pitchFamily="34" charset="0"/>
               </a:rPr>
-              <a:t>TFC, bem como na partilha de informações entre orientadores e Orientandos.</a:t>
+              <a:t>TFC, bem como na partilha de informações entre orientadores e </a:t>
+            </a:r>
+            <a:r>
+              <a:rPr lang="pt-PT" sz="2400" dirty="0" smtClean="0">
+                <a:latin typeface="+mj-lt"/>
+                <a:ea typeface="Calibri" panose="020F0502020204030204" pitchFamily="34" charset="0"/>
+              </a:rPr>
+              <a:t>Orientandos.</a:t>
             </a:r>
             <a:endParaRPr lang="pt-BR" sz="2000" dirty="0">
               <a:latin typeface="+mj-lt"/>
@@ -13148,8 +13045,8 @@
         </p:nvSpPr>
         <p:spPr bwMode="auto">
           <a:xfrm>
-            <a:off x="1376921" y="5161803"/>
-            <a:ext cx="10033687" cy="1420325"/>
+            <a:off x="1376921" y="5133302"/>
+            <a:ext cx="10033687" cy="1477328"/>
           </a:xfrm>
           <a:prstGeom prst="rect">
             <a:avLst/>
@@ -13224,7 +13121,23 @@
                 <a:ea typeface="Calibri" panose="020F0502020204030204" pitchFamily="34" charset="0"/>
                 <a:cs typeface="Times New Roman" panose="02020603050405020304" pitchFamily="18" charset="0"/>
               </a:rPr>
-              <a:t>Como melhorar a gestão e o controle do processo de trabalho de fim de curso da UTANGA garantindo a centralização de dados e a gestão mais eficiente?</a:t>
+              <a:t>Como melhorar a gestão e o controle do processo de trabalho de fim de curso da UTANGA garantindo a centralização de dados e a </a:t>
+            </a:r>
+            <a:r>
+              <a:rPr lang="pt-PT" sz="2000" b="1" dirty="0" smtClean="0">
+                <a:latin typeface="+mj-lt"/>
+                <a:ea typeface="Calibri" panose="020F0502020204030204" pitchFamily="34" charset="0"/>
+                <a:cs typeface="Times New Roman" panose="02020603050405020304" pitchFamily="18" charset="0"/>
+              </a:rPr>
+              <a:t>gestão </a:t>
+            </a:r>
+            <a:r>
+              <a:rPr lang="pt-PT" sz="2000" b="1" dirty="0" smtClean="0">
+                <a:latin typeface="+mj-lt"/>
+                <a:ea typeface="Calibri" panose="020F0502020204030204" pitchFamily="34" charset="0"/>
+                <a:cs typeface="Times New Roman" panose="02020603050405020304" pitchFamily="18" charset="0"/>
+              </a:rPr>
+              <a:t>eficiente?</a:t>
             </a:r>
             <a:endParaRPr kumimoji="0" lang="pt-PT" sz="2000" b="1" i="0" strike="noStrike" cap="none" normalizeH="0" baseline="0" dirty="0">
               <a:ln>
@@ -13378,7 +13291,51 @@
                 <a:ea typeface="Calibri" panose="020F0502020204030204" pitchFamily="34" charset="0"/>
                 <a:cs typeface="Times New Roman" panose="02020603050405020304" pitchFamily="18" charset="0"/>
               </a:rPr>
-              <a:t>Se implementarmos um sistema web para gestão e controle do processo de trabalho de fim de curso (TFC), irá possibilitar que os intervenientes tenham uma melhor interação, e informação necessárias disponível a tempo para garantir um melhor acompanhamento dos TFC. </a:t>
+              <a:t>Se implementarmos um sistema web para gestão e controle </a:t>
+            </a:r>
+            <a:r>
+              <a:rPr lang="pt-PT" sz="2400" kern="100" dirty="0" smtClean="0">
+                <a:solidFill>
+                  <a:schemeClr val="tx1"/>
+                </a:solidFill>
+                <a:latin typeface="+mj-lt"/>
+                <a:ea typeface="Calibri" panose="020F0502020204030204" pitchFamily="34" charset="0"/>
+                <a:cs typeface="Times New Roman" panose="02020603050405020304" pitchFamily="18" charset="0"/>
+              </a:rPr>
+              <a:t>dos </a:t>
+            </a:r>
+            <a:r>
+              <a:rPr lang="pt-PT" sz="2400" kern="100" dirty="0">
+                <a:solidFill>
+                  <a:schemeClr val="tx1"/>
+                </a:solidFill>
+                <a:latin typeface="+mj-lt"/>
+                <a:ea typeface="Calibri" panose="020F0502020204030204" pitchFamily="34" charset="0"/>
+                <a:cs typeface="Times New Roman" panose="02020603050405020304" pitchFamily="18" charset="0"/>
+              </a:rPr>
+              <a:t>trabalho de fim de curso (TFC), irá possibilitar que os intervenientes tenham uma melhor interação, e informação necessárias disponível a </a:t>
+            </a:r>
+            <a:r>
+              <a:rPr lang="pt-PT" sz="2400" kern="100" dirty="0" smtClean="0">
+                <a:solidFill>
+                  <a:schemeClr val="tx1"/>
+                </a:solidFill>
+                <a:latin typeface="+mj-lt"/>
+                <a:ea typeface="Calibri" panose="020F0502020204030204" pitchFamily="34" charset="0"/>
+                <a:cs typeface="Times New Roman" panose="02020603050405020304" pitchFamily="18" charset="0"/>
+              </a:rPr>
+              <a:t>tempo, </a:t>
+            </a:r>
+            <a:r>
+              <a:rPr lang="pt-PT" sz="2400" kern="100" dirty="0">
+                <a:solidFill>
+                  <a:schemeClr val="tx1"/>
+                </a:solidFill>
+                <a:latin typeface="+mj-lt"/>
+                <a:ea typeface="Calibri" panose="020F0502020204030204" pitchFamily="34" charset="0"/>
+                <a:cs typeface="Times New Roman" panose="02020603050405020304" pitchFamily="18" charset="0"/>
+              </a:rPr>
+              <a:t>para garantir um melhor acompanhamento dos TFC. </a:t>
             </a:r>
             <a:endParaRPr lang="pt-PT" sz="2400" kern="100" dirty="0">
               <a:latin typeface="+mj-lt"/>
@@ -13667,7 +13624,7 @@
         <p:spPr>
           <a:xfrm>
             <a:off x="1252151" y="3319848"/>
-            <a:ext cx="10132539" cy="2959208"/>
+            <a:ext cx="10132539" cy="3016210"/>
           </a:xfrm>
           <a:prstGeom prst="rect">
             <a:avLst/>
@@ -13696,7 +13653,28 @@
                 <a:latin typeface="+mj-lt"/>
                 <a:ea typeface="Calibri" panose="020F0502020204030204" pitchFamily="34" charset="0"/>
               </a:rPr>
-              <a:t>Entender os procedimentos envolvidos na transferência de pacientes de uma unidade hospitalar para outra.</a:t>
+              <a:t>Entender </a:t>
+            </a:r>
+            <a:r>
+              <a:rPr lang="pt-PT" sz="2000" dirty="0">
+                <a:latin typeface="+mj-lt"/>
+                <a:ea typeface="Calibri" panose="020F0502020204030204" pitchFamily="34" charset="0"/>
+              </a:rPr>
+              <a:t>o processo básico de elaboração, desenvolvimento e apresentação de </a:t>
+            </a:r>
+            <a:r>
+              <a:rPr lang="pt-PT" sz="2000" dirty="0" smtClean="0">
+                <a:latin typeface="+mj-lt"/>
+                <a:ea typeface="Calibri" panose="020F0502020204030204" pitchFamily="34" charset="0"/>
+              </a:rPr>
+              <a:t>monografias</a:t>
+            </a:r>
+            <a:r>
+              <a:rPr lang="pt-BR" sz="2000" dirty="0">
+                <a:latin typeface="+mj-lt"/>
+                <a:ea typeface="Calibri" panose="020F0502020204030204" pitchFamily="34" charset="0"/>
+              </a:rPr>
+              <a:t>;</a:t>
             </a:r>
             <a:endParaRPr lang="pt-PT" sz="2000" dirty="0">
               <a:effectLst/>
@@ -13718,7 +13696,23 @@
                 <a:latin typeface="+mj-lt"/>
                 <a:ea typeface="Calibri" panose="020F0502020204030204" pitchFamily="34" charset="0"/>
               </a:rPr>
-              <a:t>Identificar todos os requisitos descrevendo os mesmos;</a:t>
+              <a:t>Identificar </a:t>
+            </a:r>
+            <a:r>
+              <a:rPr lang="pt-BR" sz="2000" dirty="0" smtClean="0">
+                <a:effectLst/>
+                <a:latin typeface="+mj-lt"/>
+                <a:ea typeface="Calibri" panose="020F0502020204030204" pitchFamily="34" charset="0"/>
+              </a:rPr>
+              <a:t>os </a:t>
+            </a:r>
+            <a:r>
+              <a:rPr lang="pt-BR" sz="2000" dirty="0">
+                <a:effectLst/>
+                <a:latin typeface="+mj-lt"/>
+                <a:ea typeface="Calibri" panose="020F0502020204030204" pitchFamily="34" charset="0"/>
+              </a:rPr>
+              <a:t>requisitos descrevendo os mesmos;</a:t>
             </a:r>
             <a:endParaRPr lang="pt-PT" sz="2000" dirty="0">
               <a:effectLst/>

</xml_diff>